<commit_message>
Changed code file name, made changes to documentation
</commit_message>
<xml_diff>
--- a/Morse Code Reader Presentation.pptx
+++ b/Morse Code Reader Presentation.pptx
@@ -39,36 +39,36 @@
   <p:notesSz cx="6858000" cy="9144000"/>
   <p:embeddedFontLst>
     <p:embeddedFont>
-      <p:font typeface="Inria Sans" panose="020B0604020202020204" charset="0"/>
+      <p:font typeface="Lato" panose="020B0604020202020204" charset="0"/>
       <p:regular r:id="rId29"/>
       <p:bold r:id="rId30"/>
       <p:italic r:id="rId31"/>
       <p:boldItalic r:id="rId32"/>
     </p:embeddedFont>
     <p:embeddedFont>
-      <p:font typeface="Lato" panose="020F0502020204030203" pitchFamily="34" charset="0"/>
+      <p:font typeface="Inria Sans" panose="020B0604020202020204" charset="0"/>
       <p:regular r:id="rId33"/>
       <p:bold r:id="rId34"/>
       <p:italic r:id="rId35"/>
       <p:boldItalic r:id="rId36"/>
     </p:embeddedFont>
     <p:embeddedFont>
-      <p:font typeface="Lato Black" panose="020F0502020204030203" pitchFamily="34" charset="0"/>
+      <p:font typeface="Poppins Black" panose="020B0604020202020204" charset="0"/>
       <p:bold r:id="rId37"/>
       <p:boldItalic r:id="rId38"/>
     </p:embeddedFont>
     <p:embeddedFont>
-      <p:font typeface="Lexend Tera" panose="020B0604020202020204" charset="0"/>
-      <p:regular r:id="rId39"/>
-      <p:bold r:id="rId40"/>
+      <p:font typeface="Lato Black" panose="020B0604020202020204" charset="0"/>
+      <p:bold r:id="rId39"/>
+      <p:boldItalic r:id="rId40"/>
     </p:embeddedFont>
     <p:embeddedFont>
-      <p:font typeface="Poppins Black" panose="00000A00000000000000" pitchFamily="2" charset="0"/>
-      <p:bold r:id="rId41"/>
-      <p:boldItalic r:id="rId42"/>
+      <p:font typeface="Lexend Tera" panose="020B0604020202020204" charset="0"/>
+      <p:regular r:id="rId41"/>
+      <p:bold r:id="rId42"/>
     </p:embeddedFont>
     <p:embeddedFont>
-      <p:font typeface="Poppins ExtraBold" panose="00000900000000000000" pitchFamily="2" charset="0"/>
+      <p:font typeface="Poppins ExtraBold" panose="020B0604020202020204" charset="0"/>
       <p:bold r:id="rId43"/>
       <p:boldItalic r:id="rId44"/>
     </p:embeddedFont>
@@ -21567,8 +21567,8 @@
           <a:lstStyle/>
           <a:p>
             <a:r>
-              <a:rPr lang="bg-BG" dirty="0"/>
-              <a:t>Пищялка</a:t>
+              <a:rPr lang="bg-BG" dirty="0" smtClean="0"/>
+              <a:t>Звънец</a:t>
             </a:r>
             <a:endParaRPr lang="en-US" dirty="0"/>
           </a:p>
@@ -21686,8 +21686,12 @@
               <a:buNone/>
             </a:pPr>
             <a:r>
+              <a:rPr lang="bg-BG" u="sng" dirty="0" smtClean="0"/>
+              <a:t>Звънецът се </a:t>
+            </a:r>
+            <a:r>
               <a:rPr lang="bg-BG" u="sng" dirty="0"/>
-              <a:t>Пищялката се използва за:</a:t>
+              <a:t>използва за:</a:t>
             </a:r>
           </a:p>
           <a:p>
@@ -22399,8 +22403,8 @@
         </p:nvSpPr>
         <p:spPr>
           <a:xfrm>
-            <a:off x="445680" y="1233171"/>
-            <a:ext cx="4379050" cy="2561587"/>
+            <a:off x="288363" y="1292164"/>
+            <a:ext cx="4932565" cy="2561587"/>
           </a:xfrm>
         </p:spPr>
         <p:txBody>
@@ -22427,7 +22431,15 @@
             </a:pPr>
             <a:r>
               <a:rPr lang="bg-BG" dirty="0"/>
-              <a:t>При натискането на бутоните се задействат крушката, пищялката и дисплея.</a:t>
+              <a:t>При натискането на бутоните се задействат крушката, </a:t>
+            </a:r>
+            <a:r>
+              <a:rPr lang="bg-BG" dirty="0" smtClean="0"/>
+              <a:t>звънецът </a:t>
+            </a:r>
+            <a:r>
+              <a:rPr lang="bg-BG" dirty="0"/>
+              <a:t>и дисплея.</a:t>
             </a:r>
           </a:p>
         </p:txBody>
@@ -22493,7 +22505,15 @@
             </a:pPr>
             <a:r>
               <a:rPr lang="bg-BG" dirty="0"/>
-              <a:t>Крушката и пищялката са свързани с черни жички към земята и с кафяви жички към пиновете на платката, за да могат да получават информация от бутоните.</a:t>
+              <a:t>Крушката и </a:t>
+            </a:r>
+            <a:r>
+              <a:rPr lang="bg-BG" dirty="0" smtClean="0"/>
+              <a:t>звънецът </a:t>
+            </a:r>
+            <a:r>
+              <a:rPr lang="bg-BG" dirty="0"/>
+              <a:t>са свързани с черни жички към земята и с кафяви жички към пиновете на платката, за да могат да получават информация от бутоните.</a:t>
             </a:r>
             <a:endParaRPr lang="en-US" dirty="0"/>
           </a:p>
@@ -25617,8 +25637,12 @@
               <a:buChar char="●"/>
             </a:pPr>
             <a:r>
+              <a:rPr lang="bg-BG" dirty="0" smtClean="0"/>
+              <a:t>Звънец </a:t>
+            </a:r>
+            <a:r>
               <a:rPr lang="bg-BG" dirty="0"/>
-              <a:t>Пищялка (</a:t>
+              <a:t>(</a:t>
             </a:r>
             <a:r>
               <a:rPr lang="en-US" dirty="0"/>

</xml_diff>

<commit_message>
Update Morse Code Reader Presentation.pptx
</commit_message>
<xml_diff>
--- a/Morse Code Reader Presentation.pptx
+++ b/Morse Code Reader Presentation.pptx
@@ -5,73 +5,74 @@
     <p:sldMasterId id="2147483683" r:id="rId1"/>
   </p:sldMasterIdLst>
   <p:notesMasterIdLst>
-    <p:notesMasterId r:id="rId29"/>
+    <p:notesMasterId r:id="rId30"/>
   </p:notesMasterIdLst>
   <p:sldIdLst>
     <p:sldId id="256" r:id="rId2"/>
     <p:sldId id="330" r:id="rId3"/>
     <p:sldId id="261" r:id="rId4"/>
     <p:sldId id="313" r:id="rId5"/>
-    <p:sldId id="258" r:id="rId6"/>
-    <p:sldId id="262" r:id="rId7"/>
-    <p:sldId id="263" r:id="rId8"/>
-    <p:sldId id="311" r:id="rId9"/>
-    <p:sldId id="312" r:id="rId10"/>
-    <p:sldId id="314" r:id="rId11"/>
-    <p:sldId id="315" r:id="rId12"/>
-    <p:sldId id="316" r:id="rId13"/>
-    <p:sldId id="317" r:id="rId14"/>
-    <p:sldId id="268" r:id="rId15"/>
-    <p:sldId id="319" r:id="rId16"/>
-    <p:sldId id="320" r:id="rId17"/>
-    <p:sldId id="321" r:id="rId18"/>
-    <p:sldId id="322" r:id="rId19"/>
-    <p:sldId id="271" r:id="rId20"/>
-    <p:sldId id="323" r:id="rId21"/>
-    <p:sldId id="328" r:id="rId22"/>
-    <p:sldId id="324" r:id="rId23"/>
-    <p:sldId id="325" r:id="rId24"/>
-    <p:sldId id="326" r:id="rId25"/>
-    <p:sldId id="327" r:id="rId26"/>
-    <p:sldId id="284" r:id="rId27"/>
-    <p:sldId id="329" r:id="rId28"/>
+    <p:sldId id="331" r:id="rId6"/>
+    <p:sldId id="258" r:id="rId7"/>
+    <p:sldId id="262" r:id="rId8"/>
+    <p:sldId id="263" r:id="rId9"/>
+    <p:sldId id="311" r:id="rId10"/>
+    <p:sldId id="312" r:id="rId11"/>
+    <p:sldId id="314" r:id="rId12"/>
+    <p:sldId id="315" r:id="rId13"/>
+    <p:sldId id="316" r:id="rId14"/>
+    <p:sldId id="317" r:id="rId15"/>
+    <p:sldId id="268" r:id="rId16"/>
+    <p:sldId id="319" r:id="rId17"/>
+    <p:sldId id="320" r:id="rId18"/>
+    <p:sldId id="321" r:id="rId19"/>
+    <p:sldId id="322" r:id="rId20"/>
+    <p:sldId id="271" r:id="rId21"/>
+    <p:sldId id="323" r:id="rId22"/>
+    <p:sldId id="328" r:id="rId23"/>
+    <p:sldId id="324" r:id="rId24"/>
+    <p:sldId id="325" r:id="rId25"/>
+    <p:sldId id="326" r:id="rId26"/>
+    <p:sldId id="327" r:id="rId27"/>
+    <p:sldId id="284" r:id="rId28"/>
+    <p:sldId id="329" r:id="rId29"/>
   </p:sldIdLst>
   <p:sldSz cx="9144000" cy="5143500" type="screen16x9"/>
   <p:notesSz cx="6858000" cy="9144000"/>
   <p:embeddedFontLst>
     <p:embeddedFont>
       <p:font typeface="Poppins Black" panose="020B0604020202020204" charset="0"/>
-      <p:bold r:id="rId30"/>
-      <p:boldItalic r:id="rId31"/>
+      <p:bold r:id="rId31"/>
+      <p:boldItalic r:id="rId32"/>
+    </p:embeddedFont>
+    <p:embeddedFont>
+      <p:font typeface="Lato" panose="020B0604020202020204" charset="0"/>
+      <p:regular r:id="rId33"/>
+      <p:bold r:id="rId34"/>
+      <p:italic r:id="rId35"/>
+      <p:boldItalic r:id="rId36"/>
     </p:embeddedFont>
     <p:embeddedFont>
       <p:font typeface="Inria Sans" panose="020B0604020202020204" charset="0"/>
-      <p:regular r:id="rId32"/>
-      <p:bold r:id="rId33"/>
-      <p:italic r:id="rId34"/>
-      <p:boldItalic r:id="rId35"/>
+      <p:regular r:id="rId37"/>
+      <p:bold r:id="rId38"/>
+      <p:italic r:id="rId39"/>
+      <p:boldItalic r:id="rId40"/>
+    </p:embeddedFont>
+    <p:embeddedFont>
+      <p:font typeface="Lato Black" panose="020B0604020202020204" charset="0"/>
+      <p:bold r:id="rId41"/>
+      <p:boldItalic r:id="rId42"/>
+    </p:embeddedFont>
+    <p:embeddedFont>
+      <p:font typeface="Poppins ExtraBold" panose="020B0604020202020204" charset="0"/>
+      <p:bold r:id="rId43"/>
+      <p:boldItalic r:id="rId44"/>
     </p:embeddedFont>
     <p:embeddedFont>
       <p:font typeface="Lexend Tera" panose="020B0604020202020204" charset="0"/>
-      <p:regular r:id="rId36"/>
-      <p:bold r:id="rId37"/>
-    </p:embeddedFont>
-    <p:embeddedFont>
-      <p:font typeface="Lato Black" panose="020B0604020202020204" charset="0"/>
-      <p:bold r:id="rId38"/>
-      <p:boldItalic r:id="rId39"/>
-    </p:embeddedFont>
-    <p:embeddedFont>
-      <p:font typeface="Poppins ExtraBold" panose="020B0604020202020204" charset="0"/>
-      <p:bold r:id="rId40"/>
-      <p:boldItalic r:id="rId41"/>
-    </p:embeddedFont>
-    <p:embeddedFont>
-      <p:font typeface="Lato" panose="020B0604020202020204" charset="0"/>
-      <p:regular r:id="rId42"/>
-      <p:bold r:id="rId43"/>
-      <p:italic r:id="rId44"/>
-      <p:boldItalic r:id="rId45"/>
+      <p:regular r:id="rId45"/>
+      <p:bold r:id="rId46"/>
     </p:embeddedFont>
   </p:embeddedFontLst>
   <p:defaultTextStyle>
@@ -21551,6 +21552,206 @@
           <p:cNvPr id="2" name="Text Placeholder 1">
             <a:extLst>
               <a:ext uri="{FF2B5EF4-FFF2-40B4-BE49-F238E27FC236}">
+                <a16:creationId xmlns:a16="http://schemas.microsoft.com/office/drawing/2014/main" id="{AA4FCBC0-EEC1-E5F2-4861-4D129F2134AF}"/>
+              </a:ext>
+            </a:extLst>
+          </p:cNvPr>
+          <p:cNvSpPr>
+            <a:spLocks noGrp="1"/>
+          </p:cNvSpPr>
+          <p:nvPr>
+            <p:ph type="body" idx="1"/>
+          </p:nvPr>
+        </p:nvSpPr>
+        <p:spPr>
+          <a:xfrm>
+            <a:off x="352697" y="1384023"/>
+            <a:ext cx="4219303" cy="2391404"/>
+          </a:xfrm>
+        </p:spPr>
+        <p:txBody>
+          <a:bodyPr/>
+          <a:lstStyle/>
+          <a:p>
+            <a:pPr marL="165100" indent="0">
+              <a:buNone/>
+            </a:pPr>
+            <a:r>
+              <a:rPr lang="bg-BG" u="sng" dirty="0"/>
+              <a:t>С помощта на 3 бутона, ние:</a:t>
+            </a:r>
+          </a:p>
+          <a:p>
+            <a:r>
+              <a:rPr lang="bg-BG" dirty="0"/>
+              <a:t>Въвеждаме морзовият код за определена буква</a:t>
+            </a:r>
+          </a:p>
+          <a:p>
+            <a:r>
+              <a:rPr lang="bg-BG" dirty="0"/>
+              <a:t>Изписваме последната въведена буква върху дисплея</a:t>
+            </a:r>
+          </a:p>
+          <a:p>
+            <a:r>
+              <a:rPr lang="bg-BG" dirty="0"/>
+              <a:t>Изтриваме написаното върху дисплея</a:t>
+            </a:r>
+          </a:p>
+        </p:txBody>
+      </p:sp>
+      <p:sp>
+        <p:nvSpPr>
+          <p:cNvPr id="3" name="Title 2">
+            <a:extLst>
+              <a:ext uri="{FF2B5EF4-FFF2-40B4-BE49-F238E27FC236}">
+                <a16:creationId xmlns:a16="http://schemas.microsoft.com/office/drawing/2014/main" id="{8E863669-B994-D1BB-C1D4-7D3CADC3A0B5}"/>
+              </a:ext>
+            </a:extLst>
+          </p:cNvPr>
+          <p:cNvSpPr>
+            <a:spLocks noGrp="1"/>
+          </p:cNvSpPr>
+          <p:nvPr>
+            <p:ph type="title"/>
+          </p:nvPr>
+        </p:nvSpPr>
+        <p:spPr>
+          <a:xfrm>
+            <a:off x="804908" y="544568"/>
+            <a:ext cx="1520280" cy="679079"/>
+          </a:xfrm>
+        </p:spPr>
+        <p:txBody>
+          <a:bodyPr/>
+          <a:lstStyle/>
+          <a:p>
+            <a:r>
+              <a:rPr lang="bg-BG" dirty="0"/>
+              <a:t>Бутони</a:t>
+            </a:r>
+            <a:endParaRPr lang="en-US" dirty="0"/>
+          </a:p>
+        </p:txBody>
+      </p:sp>
+      <p:pic>
+        <p:nvPicPr>
+          <p:cNvPr id="5" name="Picture 4">
+            <a:extLst>
+              <a:ext uri="{FF2B5EF4-FFF2-40B4-BE49-F238E27FC236}">
+                <a16:creationId xmlns:a16="http://schemas.microsoft.com/office/drawing/2014/main" id="{425E69CA-85D8-92B1-8331-AE43D66A6E1E}"/>
+              </a:ext>
+            </a:extLst>
+          </p:cNvPr>
+          <p:cNvPicPr>
+            <a:picLocks noChangeAspect="1"/>
+          </p:cNvPicPr>
+          <p:nvPr/>
+        </p:nvPicPr>
+        <p:blipFill>
+          <a:blip r:embed="rId2"/>
+          <a:stretch>
+            <a:fillRect/>
+          </a:stretch>
+        </p:blipFill>
+        <p:spPr>
+          <a:xfrm>
+            <a:off x="4824288" y="1469833"/>
+            <a:ext cx="1781424" cy="2086266"/>
+          </a:xfrm>
+          <a:prstGeom prst="rect">
+            <a:avLst/>
+          </a:prstGeom>
+        </p:spPr>
+      </p:pic>
+      <p:sp>
+        <p:nvSpPr>
+          <p:cNvPr id="6" name="Rectangle 5">
+            <a:extLst>
+              <a:ext uri="{FF2B5EF4-FFF2-40B4-BE49-F238E27FC236}">
+                <a16:creationId xmlns:a16="http://schemas.microsoft.com/office/drawing/2014/main" id="{DB64AB20-6C51-D404-A459-D583694E0344}"/>
+              </a:ext>
+            </a:extLst>
+          </p:cNvPr>
+          <p:cNvSpPr/>
+          <p:nvPr/>
+        </p:nvSpPr>
+        <p:spPr>
+          <a:xfrm>
+            <a:off x="4824288" y="1469833"/>
+            <a:ext cx="1781424" cy="2086266"/>
+          </a:xfrm>
+          <a:prstGeom prst="rect">
+            <a:avLst/>
+          </a:prstGeom>
+          <a:noFill/>
+          <a:ln>
+            <a:solidFill>
+              <a:schemeClr val="tx1"/>
+            </a:solidFill>
+          </a:ln>
+        </p:spPr>
+        <p:style>
+          <a:lnRef idx="2">
+            <a:schemeClr val="accent1">
+              <a:shade val="50000"/>
+            </a:schemeClr>
+          </a:lnRef>
+          <a:fillRef idx="1">
+            <a:schemeClr val="accent1"/>
+          </a:fillRef>
+          <a:effectRef idx="0">
+            <a:schemeClr val="accent1"/>
+          </a:effectRef>
+          <a:fontRef idx="minor">
+            <a:schemeClr val="lt1"/>
+          </a:fontRef>
+        </p:style>
+        <p:txBody>
+          <a:bodyPr rtlCol="0" anchor="ctr"/>
+          <a:lstStyle/>
+          <a:p>
+            <a:pPr algn="ctr"/>
+            <a:endParaRPr lang="en-US"/>
+          </a:p>
+        </p:txBody>
+      </p:sp>
+    </p:spTree>
+    <p:extLst>
+      <p:ext uri="{BB962C8B-B14F-4D97-AF65-F5344CB8AC3E}">
+        <p14:creationId xmlns:p14="http://schemas.microsoft.com/office/powerpoint/2010/main" val="3082570758"/>
+      </p:ext>
+    </p:extLst>
+  </p:cSld>
+  <p:clrMapOvr>
+    <a:masterClrMapping/>
+  </p:clrMapOvr>
+</p:sld>
+</file>
+
+<file path=ppt/slides/slide11.xml><?xml version="1.0" encoding="utf-8"?>
+<p:sld xmlns:a="http://schemas.openxmlformats.org/drawingml/2006/main" xmlns:r="http://schemas.openxmlformats.org/officeDocument/2006/relationships" xmlns:p="http://schemas.openxmlformats.org/presentationml/2006/main">
+  <p:cSld>
+    <p:spTree>
+      <p:nvGrpSpPr>
+        <p:cNvPr id="1" name=""/>
+        <p:cNvGrpSpPr/>
+        <p:nvPr/>
+      </p:nvGrpSpPr>
+      <p:grpSpPr>
+        <a:xfrm>
+          <a:off x="0" y="0"/>
+          <a:ext cx="0" cy="0"/>
+          <a:chOff x="0" y="0"/>
+          <a:chExt cx="0" cy="0"/>
+        </a:xfrm>
+      </p:grpSpPr>
+      <p:sp>
+        <p:nvSpPr>
+          <p:cNvPr id="2" name="Text Placeholder 1">
+            <a:extLst>
+              <a:ext uri="{FF2B5EF4-FFF2-40B4-BE49-F238E27FC236}">
                 <a16:creationId xmlns:a16="http://schemas.microsoft.com/office/drawing/2014/main" id="{7703300A-8511-525A-BE8A-789BB52A4B3A}"/>
               </a:ext>
             </a:extLst>
@@ -22011,7 +22212,7 @@
 </p:sld>
 </file>
 
-<file path=ppt/slides/slide11.xml><?xml version="1.0" encoding="utf-8"?>
+<file path=ppt/slides/slide12.xml><?xml version="1.0" encoding="utf-8"?>
 <p:sld xmlns:a="http://schemas.openxmlformats.org/drawingml/2006/main" xmlns:r="http://schemas.openxmlformats.org/officeDocument/2006/relationships" xmlns:p="http://schemas.openxmlformats.org/presentationml/2006/main">
   <p:cSld>
     <p:spTree>
@@ -22198,7 +22399,7 @@
 </p:sld>
 </file>
 
-<file path=ppt/slides/slide12.xml><?xml version="1.0" encoding="utf-8"?>
+<file path=ppt/slides/slide13.xml><?xml version="1.0" encoding="utf-8"?>
 <p:sld xmlns:a="http://schemas.openxmlformats.org/drawingml/2006/main" xmlns:r="http://schemas.openxmlformats.org/officeDocument/2006/relationships" xmlns:p="http://schemas.openxmlformats.org/presentationml/2006/main">
   <p:cSld>
     <p:spTree>
@@ -22468,7 +22669,7 @@
 </p:sld>
 </file>
 
-<file path=ppt/slides/slide13.xml><?xml version="1.0" encoding="utf-8"?>
+<file path=ppt/slides/slide14.xml><?xml version="1.0" encoding="utf-8"?>
 <p:sld xmlns:a="http://schemas.openxmlformats.org/drawingml/2006/main" xmlns:r="http://schemas.openxmlformats.org/officeDocument/2006/relationships" xmlns:p="http://schemas.openxmlformats.org/presentationml/2006/main">
   <p:cSld>
     <p:spTree>
@@ -22651,7 +22852,7 @@
 </p:sld>
 </file>
 
-<file path=ppt/slides/slide14.xml><?xml version="1.0" encoding="utf-8"?>
+<file path=ppt/slides/slide15.xml><?xml version="1.0" encoding="utf-8"?>
 <p:sld xmlns:a="http://schemas.openxmlformats.org/drawingml/2006/main" xmlns:r="http://schemas.openxmlformats.org/officeDocument/2006/relationships" xmlns:p="http://schemas.openxmlformats.org/presentationml/2006/main">
   <p:cSld>
     <p:spTree>
@@ -22769,7 +22970,7 @@
 </p:sld>
 </file>
 
-<file path=ppt/slides/slide15.xml><?xml version="1.0" encoding="utf-8"?>
+<file path=ppt/slides/slide16.xml><?xml version="1.0" encoding="utf-8"?>
 <p:sld xmlns:a="http://schemas.openxmlformats.org/drawingml/2006/main" xmlns:r="http://schemas.openxmlformats.org/officeDocument/2006/relationships" xmlns:p="http://schemas.openxmlformats.org/presentationml/2006/main">
   <p:cSld>
     <p:spTree>
@@ -22940,7 +23141,7 @@
 </p:sld>
 </file>
 
-<file path=ppt/slides/slide16.xml><?xml version="1.0" encoding="utf-8"?>
+<file path=ppt/slides/slide17.xml><?xml version="1.0" encoding="utf-8"?>
 <p:sld xmlns:a="http://schemas.openxmlformats.org/drawingml/2006/main" xmlns:r="http://schemas.openxmlformats.org/officeDocument/2006/relationships" xmlns:p="http://schemas.openxmlformats.org/presentationml/2006/main">
   <p:cSld>
     <p:spTree>
@@ -23097,7 +23298,7 @@
 </p:sld>
 </file>
 
-<file path=ppt/slides/slide17.xml><?xml version="1.0" encoding="utf-8"?>
+<file path=ppt/slides/slide18.xml><?xml version="1.0" encoding="utf-8"?>
 <p:sld xmlns:a="http://schemas.openxmlformats.org/drawingml/2006/main" xmlns:r="http://schemas.openxmlformats.org/officeDocument/2006/relationships" xmlns:p="http://schemas.openxmlformats.org/presentationml/2006/main">
   <p:cSld>
     <p:spTree>
@@ -23250,7 +23451,7 @@
 </p:sld>
 </file>
 
-<file path=ppt/slides/slide18.xml><?xml version="1.0" encoding="utf-8"?>
+<file path=ppt/slides/slide19.xml><?xml version="1.0" encoding="utf-8"?>
 <p:sld xmlns:a="http://schemas.openxmlformats.org/drawingml/2006/main" xmlns:r="http://schemas.openxmlformats.org/officeDocument/2006/relationships" xmlns:p="http://schemas.openxmlformats.org/presentationml/2006/main">
   <p:cSld>
     <p:spTree>
@@ -23400,133 +23601,6 @@
         <p14:creationId xmlns:p14="http://schemas.microsoft.com/office/powerpoint/2010/main" val="2221917576"/>
       </p:ext>
     </p:extLst>
-  </p:cSld>
-  <p:clrMapOvr>
-    <a:masterClrMapping/>
-  </p:clrMapOvr>
-</p:sld>
-</file>
-
-<file path=ppt/slides/slide19.xml><?xml version="1.0" encoding="utf-8"?>
-<p:sld xmlns:a="http://schemas.openxmlformats.org/drawingml/2006/main" xmlns:r="http://schemas.openxmlformats.org/officeDocument/2006/relationships" xmlns:p="http://schemas.openxmlformats.org/presentationml/2006/main">
-  <p:cSld>
-    <p:bg>
-      <p:bgPr>
-        <a:solidFill>
-          <a:schemeClr val="lt1"/>
-        </a:solidFill>
-        <a:effectLst/>
-      </p:bgPr>
-    </p:bg>
-    <p:spTree>
-      <p:nvGrpSpPr>
-        <p:cNvPr id="1" name="Shape 1368"/>
-        <p:cNvGrpSpPr/>
-        <p:nvPr/>
-      </p:nvGrpSpPr>
-      <p:grpSpPr>
-        <a:xfrm>
-          <a:off x="0" y="0"/>
-          <a:ext cx="0" cy="0"/>
-          <a:chOff x="0" y="0"/>
-          <a:chExt cx="0" cy="0"/>
-        </a:xfrm>
-      </p:grpSpPr>
-      <p:sp>
-        <p:nvSpPr>
-          <p:cNvPr id="1370" name="Google Shape;1370;p53"/>
-          <p:cNvSpPr txBox="1">
-            <a:spLocks noGrp="1"/>
-          </p:cNvSpPr>
-          <p:nvPr>
-            <p:ph type="title" idx="2"/>
-          </p:nvPr>
-        </p:nvSpPr>
-        <p:spPr>
-          <a:xfrm flipH="1">
-            <a:off x="2806350" y="722525"/>
-            <a:ext cx="3531300" cy="2088600"/>
-          </a:xfrm>
-          <a:prstGeom prst="rect">
-            <a:avLst/>
-          </a:prstGeom>
-        </p:spPr>
-        <p:txBody>
-          <a:bodyPr spcFirstLastPara="1" wrap="square" lIns="0" tIns="91425" rIns="91425" bIns="91425" anchor="b" anchorCtr="0">
-            <a:noAutofit/>
-          </a:bodyPr>
-          <a:lstStyle/>
-          <a:p>
-            <a:pPr marL="0" lvl="0" indent="0" algn="ctr" rtl="0">
-              <a:spcBef>
-                <a:spcPts val="0"/>
-              </a:spcBef>
-              <a:spcAft>
-                <a:spcPts val="0"/>
-              </a:spcAft>
-              <a:buNone/>
-            </a:pPr>
-            <a:r>
-              <a:rPr lang="en">
-                <a:latin typeface="Poppins ExtraBold"/>
-                <a:ea typeface="Poppins ExtraBold"/>
-                <a:cs typeface="Poppins ExtraBold"/>
-                <a:sym typeface="Poppins ExtraBold"/>
-              </a:rPr>
-              <a:t>03</a:t>
-            </a:r>
-            <a:endParaRPr>
-              <a:latin typeface="Poppins ExtraBold"/>
-              <a:ea typeface="Poppins ExtraBold"/>
-              <a:cs typeface="Poppins ExtraBold"/>
-              <a:sym typeface="Poppins ExtraBold"/>
-            </a:endParaRPr>
-          </a:p>
-        </p:txBody>
-      </p:sp>
-      <p:sp>
-        <p:nvSpPr>
-          <p:cNvPr id="1371" name="Google Shape;1371;p53"/>
-          <p:cNvSpPr txBox="1">
-            <a:spLocks noGrp="1"/>
-          </p:cNvSpPr>
-          <p:nvPr>
-            <p:ph type="title"/>
-          </p:nvPr>
-        </p:nvSpPr>
-        <p:spPr>
-          <a:xfrm flipH="1">
-            <a:off x="2128050" y="2534375"/>
-            <a:ext cx="4887900" cy="952800"/>
-          </a:xfrm>
-          <a:prstGeom prst="rect">
-            <a:avLst/>
-          </a:prstGeom>
-        </p:spPr>
-        <p:txBody>
-          <a:bodyPr spcFirstLastPara="1" wrap="square" lIns="0" tIns="91425" rIns="91425" bIns="91425" anchor="ctr" anchorCtr="0">
-            <a:noAutofit/>
-          </a:bodyPr>
-          <a:lstStyle/>
-          <a:p>
-            <a:pPr marL="0" lvl="0" indent="0" algn="ctr" rtl="0">
-              <a:spcBef>
-                <a:spcPts val="0"/>
-              </a:spcBef>
-              <a:spcAft>
-                <a:spcPts val="0"/>
-              </a:spcAft>
-              <a:buNone/>
-            </a:pPr>
-            <a:r>
-              <a:rPr lang="bg-BG" dirty="0"/>
-              <a:t>Писането на кода</a:t>
-            </a:r>
-            <a:endParaRPr dirty="0"/>
-          </a:p>
-        </p:txBody>
-      </p:sp>
-    </p:spTree>
   </p:cSld>
   <p:clrMapOvr>
     <a:masterClrMapping/>
@@ -23642,6 +23716,133 @@
 <file path=ppt/slides/slide20.xml><?xml version="1.0" encoding="utf-8"?>
 <p:sld xmlns:a="http://schemas.openxmlformats.org/drawingml/2006/main" xmlns:r="http://schemas.openxmlformats.org/officeDocument/2006/relationships" xmlns:p="http://schemas.openxmlformats.org/presentationml/2006/main">
   <p:cSld>
+    <p:bg>
+      <p:bgPr>
+        <a:solidFill>
+          <a:schemeClr val="lt1"/>
+        </a:solidFill>
+        <a:effectLst/>
+      </p:bgPr>
+    </p:bg>
+    <p:spTree>
+      <p:nvGrpSpPr>
+        <p:cNvPr id="1" name="Shape 1368"/>
+        <p:cNvGrpSpPr/>
+        <p:nvPr/>
+      </p:nvGrpSpPr>
+      <p:grpSpPr>
+        <a:xfrm>
+          <a:off x="0" y="0"/>
+          <a:ext cx="0" cy="0"/>
+          <a:chOff x="0" y="0"/>
+          <a:chExt cx="0" cy="0"/>
+        </a:xfrm>
+      </p:grpSpPr>
+      <p:sp>
+        <p:nvSpPr>
+          <p:cNvPr id="1370" name="Google Shape;1370;p53"/>
+          <p:cNvSpPr txBox="1">
+            <a:spLocks noGrp="1"/>
+          </p:cNvSpPr>
+          <p:nvPr>
+            <p:ph type="title" idx="2"/>
+          </p:nvPr>
+        </p:nvSpPr>
+        <p:spPr>
+          <a:xfrm flipH="1">
+            <a:off x="2806350" y="722525"/>
+            <a:ext cx="3531300" cy="2088600"/>
+          </a:xfrm>
+          <a:prstGeom prst="rect">
+            <a:avLst/>
+          </a:prstGeom>
+        </p:spPr>
+        <p:txBody>
+          <a:bodyPr spcFirstLastPara="1" wrap="square" lIns="0" tIns="91425" rIns="91425" bIns="91425" anchor="b" anchorCtr="0">
+            <a:noAutofit/>
+          </a:bodyPr>
+          <a:lstStyle/>
+          <a:p>
+            <a:pPr marL="0" lvl="0" indent="0" algn="ctr" rtl="0">
+              <a:spcBef>
+                <a:spcPts val="0"/>
+              </a:spcBef>
+              <a:spcAft>
+                <a:spcPts val="0"/>
+              </a:spcAft>
+              <a:buNone/>
+            </a:pPr>
+            <a:r>
+              <a:rPr lang="en">
+                <a:latin typeface="Poppins ExtraBold"/>
+                <a:ea typeface="Poppins ExtraBold"/>
+                <a:cs typeface="Poppins ExtraBold"/>
+                <a:sym typeface="Poppins ExtraBold"/>
+              </a:rPr>
+              <a:t>03</a:t>
+            </a:r>
+            <a:endParaRPr>
+              <a:latin typeface="Poppins ExtraBold"/>
+              <a:ea typeface="Poppins ExtraBold"/>
+              <a:cs typeface="Poppins ExtraBold"/>
+              <a:sym typeface="Poppins ExtraBold"/>
+            </a:endParaRPr>
+          </a:p>
+        </p:txBody>
+      </p:sp>
+      <p:sp>
+        <p:nvSpPr>
+          <p:cNvPr id="1371" name="Google Shape;1371;p53"/>
+          <p:cNvSpPr txBox="1">
+            <a:spLocks noGrp="1"/>
+          </p:cNvSpPr>
+          <p:nvPr>
+            <p:ph type="title"/>
+          </p:nvPr>
+        </p:nvSpPr>
+        <p:spPr>
+          <a:xfrm flipH="1">
+            <a:off x="2128050" y="2534375"/>
+            <a:ext cx="4887900" cy="952800"/>
+          </a:xfrm>
+          <a:prstGeom prst="rect">
+            <a:avLst/>
+          </a:prstGeom>
+        </p:spPr>
+        <p:txBody>
+          <a:bodyPr spcFirstLastPara="1" wrap="square" lIns="0" tIns="91425" rIns="91425" bIns="91425" anchor="ctr" anchorCtr="0">
+            <a:noAutofit/>
+          </a:bodyPr>
+          <a:lstStyle/>
+          <a:p>
+            <a:pPr marL="0" lvl="0" indent="0" algn="ctr" rtl="0">
+              <a:spcBef>
+                <a:spcPts val="0"/>
+              </a:spcBef>
+              <a:spcAft>
+                <a:spcPts val="0"/>
+              </a:spcAft>
+              <a:buNone/>
+            </a:pPr>
+            <a:r>
+              <a:rPr lang="bg-BG" dirty="0"/>
+              <a:t>Писането на кода</a:t>
+            </a:r>
+            <a:endParaRPr dirty="0"/>
+          </a:p>
+        </p:txBody>
+      </p:sp>
+    </p:spTree>
+  </p:cSld>
+  <p:clrMapOvr>
+    <a:masterClrMapping/>
+  </p:clrMapOvr>
+</p:sld>
+</file>
+
+<file path=ppt/slides/slide21.xml><?xml version="1.0" encoding="utf-8"?>
+<p:sld xmlns:a="http://schemas.openxmlformats.org/drawingml/2006/main" xmlns:r="http://schemas.openxmlformats.org/officeDocument/2006/relationships" xmlns:p="http://schemas.openxmlformats.org/presentationml/2006/main">
+  <p:cSld>
     <p:spTree>
       <p:nvGrpSpPr>
         <p:cNvPr id="1" name=""/>
@@ -23811,7 +24012,7 @@
 </p:sld>
 </file>
 
-<file path=ppt/slides/slide21.xml><?xml version="1.0" encoding="utf-8"?>
+<file path=ppt/slides/slide22.xml><?xml version="1.0" encoding="utf-8"?>
 <p:sld xmlns:a="http://schemas.openxmlformats.org/drawingml/2006/main" xmlns:r="http://schemas.openxmlformats.org/officeDocument/2006/relationships" xmlns:p="http://schemas.openxmlformats.org/presentationml/2006/main">
   <p:cSld>
     <p:spTree>
@@ -23984,7 +24185,7 @@
 </p:sld>
 </file>
 
-<file path=ppt/slides/slide22.xml><?xml version="1.0" encoding="utf-8"?>
+<file path=ppt/slides/slide23.xml><?xml version="1.0" encoding="utf-8"?>
 <p:sld xmlns:a="http://schemas.openxmlformats.org/drawingml/2006/main" xmlns:r="http://schemas.openxmlformats.org/officeDocument/2006/relationships" xmlns:p="http://schemas.openxmlformats.org/presentationml/2006/main">
   <p:cSld>
     <p:spTree>
@@ -24136,7 +24337,7 @@
 </p:sld>
 </file>
 
-<file path=ppt/slides/slide23.xml><?xml version="1.0" encoding="utf-8"?>
+<file path=ppt/slides/slide24.xml><?xml version="1.0" encoding="utf-8"?>
 <p:sld xmlns:a="http://schemas.openxmlformats.org/drawingml/2006/main" xmlns:r="http://schemas.openxmlformats.org/officeDocument/2006/relationships" xmlns:p="http://schemas.openxmlformats.org/presentationml/2006/main">
   <p:cSld>
     <p:spTree>
@@ -24391,7 +24592,7 @@
 </p:sld>
 </file>
 
-<file path=ppt/slides/slide24.xml><?xml version="1.0" encoding="utf-8"?>
+<file path=ppt/slides/slide25.xml><?xml version="1.0" encoding="utf-8"?>
 <p:sld xmlns:a="http://schemas.openxmlformats.org/drawingml/2006/main" xmlns:r="http://schemas.openxmlformats.org/officeDocument/2006/relationships" xmlns:p="http://schemas.openxmlformats.org/presentationml/2006/main">
   <p:cSld>
     <p:spTree>
@@ -24564,7 +24765,7 @@
 </p:sld>
 </file>
 
-<file path=ppt/slides/slide25.xml><?xml version="1.0" encoding="utf-8"?>
+<file path=ppt/slides/slide26.xml><?xml version="1.0" encoding="utf-8"?>
 <p:sld xmlns:a="http://schemas.openxmlformats.org/drawingml/2006/main" xmlns:r="http://schemas.openxmlformats.org/officeDocument/2006/relationships" xmlns:p="http://schemas.openxmlformats.org/presentationml/2006/main">
   <p:cSld>
     <p:spTree>
@@ -24737,7 +24938,7 @@
 </p:sld>
 </file>
 
-<file path=ppt/slides/slide26.xml><?xml version="1.0" encoding="utf-8"?>
+<file path=ppt/slides/slide27.xml><?xml version="1.0" encoding="utf-8"?>
 <p:sld xmlns:a="http://schemas.openxmlformats.org/drawingml/2006/main" xmlns:r="http://schemas.openxmlformats.org/officeDocument/2006/relationships" xmlns:p="http://schemas.openxmlformats.org/presentationml/2006/main">
   <p:cSld>
     <p:bg>
@@ -24864,7 +25065,7 @@
 </p:sld>
 </file>
 
-<file path=ppt/slides/slide27.xml><?xml version="1.0" encoding="utf-8"?>
+<file path=ppt/slides/slide28.xml><?xml version="1.0" encoding="utf-8"?>
 <p:sld xmlns:a="http://schemas.openxmlformats.org/drawingml/2006/main" xmlns:r="http://schemas.openxmlformats.org/officeDocument/2006/relationships" xmlns:p="http://schemas.openxmlformats.org/presentationml/2006/main">
   <p:cSld>
     <p:spTree>
@@ -25535,6 +25736,106 @@
   <p:cSld>
     <p:spTree>
       <p:nvGrpSpPr>
+        <p:cNvPr id="1" name=""/>
+        <p:cNvGrpSpPr/>
+        <p:nvPr/>
+      </p:nvGrpSpPr>
+      <p:grpSpPr>
+        <a:xfrm>
+          <a:off x="0" y="0"/>
+          <a:ext cx="0" cy="0"/>
+          <a:chOff x="0" y="0"/>
+          <a:chExt cx="0" cy="0"/>
+        </a:xfrm>
+      </p:grpSpPr>
+      <p:pic>
+        <p:nvPicPr>
+          <p:cNvPr id="5" name="Picture 4"/>
+          <p:cNvPicPr>
+            <a:picLocks noChangeAspect="1"/>
+          </p:cNvPicPr>
+          <p:nvPr/>
+        </p:nvPicPr>
+        <p:blipFill>
+          <a:blip r:embed="rId2"/>
+          <a:stretch>
+            <a:fillRect/>
+          </a:stretch>
+        </p:blipFill>
+        <p:spPr>
+          <a:xfrm>
+            <a:off x="1437837" y="709352"/>
+            <a:ext cx="6268325" cy="3724795"/>
+          </a:xfrm>
+          <a:prstGeom prst="rect">
+            <a:avLst/>
+          </a:prstGeom>
+        </p:spPr>
+      </p:pic>
+      <p:sp>
+        <p:nvSpPr>
+          <p:cNvPr id="6" name="Rectangle 5"/>
+          <p:cNvSpPr/>
+          <p:nvPr/>
+        </p:nvSpPr>
+        <p:spPr>
+          <a:xfrm>
+            <a:off x="1437837" y="709352"/>
+            <a:ext cx="6268325" cy="3724795"/>
+          </a:xfrm>
+          <a:prstGeom prst="rect">
+            <a:avLst/>
+          </a:prstGeom>
+          <a:noFill/>
+          <a:ln>
+            <a:solidFill>
+              <a:schemeClr val="tx1"/>
+            </a:solidFill>
+          </a:ln>
+        </p:spPr>
+        <p:style>
+          <a:lnRef idx="2">
+            <a:schemeClr val="accent1">
+              <a:shade val="50000"/>
+            </a:schemeClr>
+          </a:lnRef>
+          <a:fillRef idx="1">
+            <a:schemeClr val="accent1"/>
+          </a:fillRef>
+          <a:effectRef idx="0">
+            <a:schemeClr val="accent1"/>
+          </a:effectRef>
+          <a:fontRef idx="minor">
+            <a:schemeClr val="lt1"/>
+          </a:fontRef>
+        </p:style>
+        <p:txBody>
+          <a:bodyPr rtlCol="0" anchor="ctr"/>
+          <a:lstStyle/>
+          <a:p>
+            <a:pPr algn="ctr"/>
+            <a:endParaRPr lang="en-US"/>
+          </a:p>
+        </p:txBody>
+      </p:sp>
+    </p:spTree>
+    <p:extLst>
+      <p:ext uri="{BB962C8B-B14F-4D97-AF65-F5344CB8AC3E}">
+        <p14:creationId xmlns:p14="http://schemas.microsoft.com/office/powerpoint/2010/main" val="4182342256"/>
+      </p:ext>
+    </p:extLst>
+  </p:cSld>
+  <p:clrMapOvr>
+    <a:masterClrMapping/>
+  </p:clrMapOvr>
+</p:sld>
+</file>
+
+<file path=ppt/slides/slide6.xml><?xml version="1.0" encoding="utf-8"?>
+<p:sld xmlns:a="http://schemas.openxmlformats.org/drawingml/2006/main" xmlns:r="http://schemas.openxmlformats.org/officeDocument/2006/relationships" xmlns:p="http://schemas.openxmlformats.org/presentationml/2006/main">
+  <p:cSld>
+    <p:spTree>
+      <p:nvGrpSpPr>
         <p:cNvPr id="1" name="Shape 1182"/>
         <p:cNvGrpSpPr/>
         <p:nvPr/>
@@ -25933,7 +26234,7 @@
 </p:sld>
 </file>
 
-<file path=ppt/slides/slide6.xml><?xml version="1.0" encoding="utf-8"?>
+<file path=ppt/slides/slide7.xml><?xml version="1.0" encoding="utf-8"?>
 <p:sld xmlns:a="http://schemas.openxmlformats.org/drawingml/2006/main" xmlns:r="http://schemas.openxmlformats.org/officeDocument/2006/relationships" xmlns:p="http://schemas.openxmlformats.org/presentationml/2006/main">
   <p:cSld>
     <p:bg>
@@ -26060,7 +26361,7 @@
 </p:sld>
 </file>
 
-<file path=ppt/slides/slide7.xml><?xml version="1.0" encoding="utf-8"?>
+<file path=ppt/slides/slide8.xml><?xml version="1.0" encoding="utf-8"?>
 <p:sld xmlns:a="http://schemas.openxmlformats.org/drawingml/2006/main" xmlns:r="http://schemas.openxmlformats.org/officeDocument/2006/relationships" xmlns:p="http://schemas.openxmlformats.org/presentationml/2006/main">
   <p:cSld>
     <p:spTree>
@@ -26330,7 +26631,7 @@
 </p:sld>
 </file>
 
-<file path=ppt/slides/slide8.xml><?xml version="1.0" encoding="utf-8"?>
+<file path=ppt/slides/slide9.xml><?xml version="1.0" encoding="utf-8"?>
 <p:sld xmlns:a="http://schemas.openxmlformats.org/drawingml/2006/main" xmlns:r="http://schemas.openxmlformats.org/officeDocument/2006/relationships" xmlns:p="http://schemas.openxmlformats.org/presentationml/2006/main">
   <p:cSld>
     <p:spTree>
@@ -26433,206 +26734,6 @@
     <p:extLst>
       <p:ext uri="{BB962C8B-B14F-4D97-AF65-F5344CB8AC3E}">
         <p14:creationId xmlns:p14="http://schemas.microsoft.com/office/powerpoint/2010/main" val="3676992844"/>
-      </p:ext>
-    </p:extLst>
-  </p:cSld>
-  <p:clrMapOvr>
-    <a:masterClrMapping/>
-  </p:clrMapOvr>
-</p:sld>
-</file>
-
-<file path=ppt/slides/slide9.xml><?xml version="1.0" encoding="utf-8"?>
-<p:sld xmlns:a="http://schemas.openxmlformats.org/drawingml/2006/main" xmlns:r="http://schemas.openxmlformats.org/officeDocument/2006/relationships" xmlns:p="http://schemas.openxmlformats.org/presentationml/2006/main">
-  <p:cSld>
-    <p:spTree>
-      <p:nvGrpSpPr>
-        <p:cNvPr id="1" name=""/>
-        <p:cNvGrpSpPr/>
-        <p:nvPr/>
-      </p:nvGrpSpPr>
-      <p:grpSpPr>
-        <a:xfrm>
-          <a:off x="0" y="0"/>
-          <a:ext cx="0" cy="0"/>
-          <a:chOff x="0" y="0"/>
-          <a:chExt cx="0" cy="0"/>
-        </a:xfrm>
-      </p:grpSpPr>
-      <p:sp>
-        <p:nvSpPr>
-          <p:cNvPr id="2" name="Text Placeholder 1">
-            <a:extLst>
-              <a:ext uri="{FF2B5EF4-FFF2-40B4-BE49-F238E27FC236}">
-                <a16:creationId xmlns:a16="http://schemas.microsoft.com/office/drawing/2014/main" id="{AA4FCBC0-EEC1-E5F2-4861-4D129F2134AF}"/>
-              </a:ext>
-            </a:extLst>
-          </p:cNvPr>
-          <p:cNvSpPr>
-            <a:spLocks noGrp="1"/>
-          </p:cNvSpPr>
-          <p:nvPr>
-            <p:ph type="body" idx="1"/>
-          </p:nvPr>
-        </p:nvSpPr>
-        <p:spPr>
-          <a:xfrm>
-            <a:off x="352697" y="1384023"/>
-            <a:ext cx="4219303" cy="2391404"/>
-          </a:xfrm>
-        </p:spPr>
-        <p:txBody>
-          <a:bodyPr/>
-          <a:lstStyle/>
-          <a:p>
-            <a:pPr marL="165100" indent="0">
-              <a:buNone/>
-            </a:pPr>
-            <a:r>
-              <a:rPr lang="bg-BG" u="sng" dirty="0"/>
-              <a:t>С помощта на 3 бутона, ние:</a:t>
-            </a:r>
-          </a:p>
-          <a:p>
-            <a:r>
-              <a:rPr lang="bg-BG" dirty="0"/>
-              <a:t>Въвеждаме морзовият код за определена буква</a:t>
-            </a:r>
-          </a:p>
-          <a:p>
-            <a:r>
-              <a:rPr lang="bg-BG" dirty="0"/>
-              <a:t>Изписваме последната въведена буква върху дисплея</a:t>
-            </a:r>
-          </a:p>
-          <a:p>
-            <a:r>
-              <a:rPr lang="bg-BG" dirty="0"/>
-              <a:t>Изтриваме написаното върху дисплея</a:t>
-            </a:r>
-          </a:p>
-        </p:txBody>
-      </p:sp>
-      <p:sp>
-        <p:nvSpPr>
-          <p:cNvPr id="3" name="Title 2">
-            <a:extLst>
-              <a:ext uri="{FF2B5EF4-FFF2-40B4-BE49-F238E27FC236}">
-                <a16:creationId xmlns:a16="http://schemas.microsoft.com/office/drawing/2014/main" id="{8E863669-B994-D1BB-C1D4-7D3CADC3A0B5}"/>
-              </a:ext>
-            </a:extLst>
-          </p:cNvPr>
-          <p:cNvSpPr>
-            <a:spLocks noGrp="1"/>
-          </p:cNvSpPr>
-          <p:nvPr>
-            <p:ph type="title"/>
-          </p:nvPr>
-        </p:nvSpPr>
-        <p:spPr>
-          <a:xfrm>
-            <a:off x="804908" y="544568"/>
-            <a:ext cx="1520280" cy="679079"/>
-          </a:xfrm>
-        </p:spPr>
-        <p:txBody>
-          <a:bodyPr/>
-          <a:lstStyle/>
-          <a:p>
-            <a:r>
-              <a:rPr lang="bg-BG" dirty="0"/>
-              <a:t>Бутони</a:t>
-            </a:r>
-            <a:endParaRPr lang="en-US" dirty="0"/>
-          </a:p>
-        </p:txBody>
-      </p:sp>
-      <p:pic>
-        <p:nvPicPr>
-          <p:cNvPr id="5" name="Picture 4">
-            <a:extLst>
-              <a:ext uri="{FF2B5EF4-FFF2-40B4-BE49-F238E27FC236}">
-                <a16:creationId xmlns:a16="http://schemas.microsoft.com/office/drawing/2014/main" id="{425E69CA-85D8-92B1-8331-AE43D66A6E1E}"/>
-              </a:ext>
-            </a:extLst>
-          </p:cNvPr>
-          <p:cNvPicPr>
-            <a:picLocks noChangeAspect="1"/>
-          </p:cNvPicPr>
-          <p:nvPr/>
-        </p:nvPicPr>
-        <p:blipFill>
-          <a:blip r:embed="rId2"/>
-          <a:stretch>
-            <a:fillRect/>
-          </a:stretch>
-        </p:blipFill>
-        <p:spPr>
-          <a:xfrm>
-            <a:off x="4824288" y="1469833"/>
-            <a:ext cx="1781424" cy="2086266"/>
-          </a:xfrm>
-          <a:prstGeom prst="rect">
-            <a:avLst/>
-          </a:prstGeom>
-        </p:spPr>
-      </p:pic>
-      <p:sp>
-        <p:nvSpPr>
-          <p:cNvPr id="6" name="Rectangle 5">
-            <a:extLst>
-              <a:ext uri="{FF2B5EF4-FFF2-40B4-BE49-F238E27FC236}">
-                <a16:creationId xmlns:a16="http://schemas.microsoft.com/office/drawing/2014/main" id="{DB64AB20-6C51-D404-A459-D583694E0344}"/>
-              </a:ext>
-            </a:extLst>
-          </p:cNvPr>
-          <p:cNvSpPr/>
-          <p:nvPr/>
-        </p:nvSpPr>
-        <p:spPr>
-          <a:xfrm>
-            <a:off x="4824288" y="1469833"/>
-            <a:ext cx="1781424" cy="2086266"/>
-          </a:xfrm>
-          <a:prstGeom prst="rect">
-            <a:avLst/>
-          </a:prstGeom>
-          <a:noFill/>
-          <a:ln>
-            <a:solidFill>
-              <a:schemeClr val="tx1"/>
-            </a:solidFill>
-          </a:ln>
-        </p:spPr>
-        <p:style>
-          <a:lnRef idx="2">
-            <a:schemeClr val="accent1">
-              <a:shade val="50000"/>
-            </a:schemeClr>
-          </a:lnRef>
-          <a:fillRef idx="1">
-            <a:schemeClr val="accent1"/>
-          </a:fillRef>
-          <a:effectRef idx="0">
-            <a:schemeClr val="accent1"/>
-          </a:effectRef>
-          <a:fontRef idx="minor">
-            <a:schemeClr val="lt1"/>
-          </a:fontRef>
-        </p:style>
-        <p:txBody>
-          <a:bodyPr rtlCol="0" anchor="ctr"/>
-          <a:lstStyle/>
-          <a:p>
-            <a:pPr algn="ctr"/>
-            <a:endParaRPr lang="en-US"/>
-          </a:p>
-        </p:txBody>
-      </p:sp>
-    </p:spTree>
-    <p:extLst>
-      <p:ext uri="{BB962C8B-B14F-4D97-AF65-F5344CB8AC3E}">
-        <p14:creationId xmlns:p14="http://schemas.microsoft.com/office/powerpoint/2010/main" val="3082570758"/>
       </p:ext>
     </p:extLst>
   </p:cSld>

</xml_diff>

<commit_message>
fixed code and documentation
</commit_message>
<xml_diff>
--- a/Morse Code Reader Presentation.pptx
+++ b/Morse Code Reader Presentation.pptx
@@ -41,32 +41,32 @@
   <p:notesSz cx="6858000" cy="9144000"/>
   <p:embeddedFontLst>
     <p:embeddedFont>
-      <p:font typeface="Poppins Black" panose="020B0604020202020204" charset="0"/>
+      <p:font typeface="Poppins ExtraBold" panose="020B0604020202020204" charset="0"/>
       <p:bold r:id="rId31"/>
       <p:boldItalic r:id="rId32"/>
     </p:embeddedFont>
     <p:embeddedFont>
-      <p:font typeface="Lato" panose="020B0604020202020204" charset="0"/>
+      <p:font typeface="Inria Sans" panose="020B0604020202020204" charset="0"/>
       <p:regular r:id="rId33"/>
       <p:bold r:id="rId34"/>
       <p:italic r:id="rId35"/>
       <p:boldItalic r:id="rId36"/>
     </p:embeddedFont>
     <p:embeddedFont>
-      <p:font typeface="Inria Sans" panose="020B0604020202020204" charset="0"/>
-      <p:regular r:id="rId37"/>
-      <p:bold r:id="rId38"/>
-      <p:italic r:id="rId39"/>
+      <p:font typeface="Lato Black" panose="020B0604020202020204" charset="0"/>
+      <p:bold r:id="rId37"/>
+      <p:boldItalic r:id="rId38"/>
+    </p:embeddedFont>
+    <p:embeddedFont>
+      <p:font typeface="Poppins Black" panose="020B0604020202020204" charset="0"/>
+      <p:bold r:id="rId39"/>
       <p:boldItalic r:id="rId40"/>
     </p:embeddedFont>
     <p:embeddedFont>
-      <p:font typeface="Lato Black" panose="020B0604020202020204" charset="0"/>
-      <p:bold r:id="rId41"/>
-      <p:boldItalic r:id="rId42"/>
-    </p:embeddedFont>
-    <p:embeddedFont>
-      <p:font typeface="Poppins ExtraBold" panose="020B0604020202020204" charset="0"/>
-      <p:bold r:id="rId43"/>
+      <p:font typeface="Lato" panose="020B0604020202020204" charset="0"/>
+      <p:regular r:id="rId41"/>
+      <p:bold r:id="rId42"/>
+      <p:italic r:id="rId43"/>
       <p:boldItalic r:id="rId44"/>
     </p:embeddedFont>
     <p:embeddedFont>
@@ -24090,36 +24090,6 @@
           </a:p>
         </p:txBody>
       </p:sp>
-      <p:pic>
-        <p:nvPicPr>
-          <p:cNvPr id="5" name="Picture 4">
-            <a:extLst>
-              <a:ext uri="{FF2B5EF4-FFF2-40B4-BE49-F238E27FC236}">
-                <a16:creationId xmlns:a16="http://schemas.microsoft.com/office/drawing/2014/main" id="{8EA578FB-7172-15FE-7F2D-A1DF790E6D95}"/>
-              </a:ext>
-            </a:extLst>
-          </p:cNvPr>
-          <p:cNvPicPr>
-            <a:picLocks noChangeAspect="1"/>
-          </p:cNvPicPr>
-          <p:nvPr/>
-        </p:nvPicPr>
-        <p:blipFill>
-          <a:blip r:embed="rId2"/>
-          <a:stretch>
-            <a:fillRect/>
-          </a:stretch>
-        </p:blipFill>
-        <p:spPr>
-          <a:xfrm>
-            <a:off x="4784419" y="696150"/>
-            <a:ext cx="4032989" cy="3990150"/>
-          </a:xfrm>
-          <a:prstGeom prst="rect">
-            <a:avLst/>
-          </a:prstGeom>
-        </p:spPr>
-      </p:pic>
       <p:sp>
         <p:nvSpPr>
           <p:cNvPr id="6" name="Rectangle 5">
@@ -24134,8 +24104,8 @@
         </p:nvSpPr>
         <p:spPr>
           <a:xfrm>
-            <a:off x="4777740" y="685800"/>
-            <a:ext cx="4046220" cy="4008120"/>
+            <a:off x="4579620" y="678180"/>
+            <a:ext cx="4251960" cy="4023360"/>
           </a:xfrm>
           <a:prstGeom prst="rect">
             <a:avLst/>
@@ -24172,6 +24142,30 @@
           </a:p>
         </p:txBody>
       </p:sp>
+      <p:pic>
+        <p:nvPicPr>
+          <p:cNvPr id="3" name="Picture 2"/>
+          <p:cNvPicPr>
+            <a:picLocks noChangeAspect="1"/>
+          </p:cNvPicPr>
+          <p:nvPr/>
+        </p:nvPicPr>
+        <p:blipFill>
+          <a:blip r:embed="rId2"/>
+          <a:stretch>
+            <a:fillRect/>
+          </a:stretch>
+        </p:blipFill>
+        <p:spPr>
+          <a:xfrm>
+            <a:off x="4591050" y="685800"/>
+            <a:ext cx="4232909" cy="4008120"/>
+          </a:xfrm>
+          <a:prstGeom prst="rect">
+            <a:avLst/>
+          </a:prstGeom>
+        </p:spPr>
+      </p:pic>
     </p:spTree>
     <p:extLst>
       <p:ext uri="{BB962C8B-B14F-4D97-AF65-F5344CB8AC3E}">
@@ -24242,36 +24236,6 @@
           </a:p>
         </p:txBody>
       </p:sp>
-      <p:pic>
-        <p:nvPicPr>
-          <p:cNvPr id="5" name="Picture 4">
-            <a:extLst>
-              <a:ext uri="{FF2B5EF4-FFF2-40B4-BE49-F238E27FC236}">
-                <a16:creationId xmlns:a16="http://schemas.microsoft.com/office/drawing/2014/main" id="{5A1438E4-B331-A68D-5582-A088492B5078}"/>
-              </a:ext>
-            </a:extLst>
-          </p:cNvPr>
-          <p:cNvPicPr>
-            <a:picLocks noChangeAspect="1"/>
-          </p:cNvPicPr>
-          <p:nvPr/>
-        </p:nvPicPr>
-        <p:blipFill>
-          <a:blip r:embed="rId2"/>
-          <a:stretch>
-            <a:fillRect/>
-          </a:stretch>
-        </p:blipFill>
-        <p:spPr>
-          <a:xfrm>
-            <a:off x="4655820" y="1087818"/>
-            <a:ext cx="4134222" cy="3232893"/>
-          </a:xfrm>
-          <a:prstGeom prst="rect">
-            <a:avLst/>
-          </a:prstGeom>
-        </p:spPr>
-      </p:pic>
       <p:sp>
         <p:nvSpPr>
           <p:cNvPr id="6" name="Rectangle 5">
@@ -24286,8 +24250,8 @@
         </p:nvSpPr>
         <p:spPr>
           <a:xfrm>
-            <a:off x="4655820" y="1087818"/>
-            <a:ext cx="4134222" cy="3232893"/>
+            <a:off x="4876800" y="1073426"/>
+            <a:ext cx="3929270" cy="3260035"/>
           </a:xfrm>
           <a:prstGeom prst="rect">
             <a:avLst/>
@@ -24324,6 +24288,30 @@
           </a:p>
         </p:txBody>
       </p:sp>
+      <p:pic>
+        <p:nvPicPr>
+          <p:cNvPr id="7" name="Picture 6"/>
+          <p:cNvPicPr>
+            <a:picLocks noChangeAspect="1"/>
+          </p:cNvPicPr>
+          <p:nvPr/>
+        </p:nvPicPr>
+        <p:blipFill>
+          <a:blip r:embed="rId2"/>
+          <a:stretch>
+            <a:fillRect/>
+          </a:stretch>
+        </p:blipFill>
+        <p:spPr>
+          <a:xfrm>
+            <a:off x="4890053" y="1089425"/>
+            <a:ext cx="3899990" cy="3231285"/>
+          </a:xfrm>
+          <a:prstGeom prst="rect">
+            <a:avLst/>
+          </a:prstGeom>
+        </p:spPr>
+      </p:pic>
     </p:spTree>
     <p:extLst>
       <p:ext uri="{BB962C8B-B14F-4D97-AF65-F5344CB8AC3E}">
@@ -24400,88 +24388,6 @@
       </p:sp>
       <p:pic>
         <p:nvPicPr>
-          <p:cNvPr id="5" name="Picture 4">
-            <a:extLst>
-              <a:ext uri="{FF2B5EF4-FFF2-40B4-BE49-F238E27FC236}">
-                <a16:creationId xmlns:a16="http://schemas.microsoft.com/office/drawing/2014/main" id="{62C64C91-B3EB-C959-F0C9-A2F134619CE6}"/>
-              </a:ext>
-            </a:extLst>
-          </p:cNvPr>
-          <p:cNvPicPr>
-            <a:picLocks noChangeAspect="1"/>
-          </p:cNvPicPr>
-          <p:nvPr/>
-        </p:nvPicPr>
-        <p:blipFill>
-          <a:blip r:embed="rId2"/>
-          <a:stretch>
-            <a:fillRect/>
-          </a:stretch>
-        </p:blipFill>
-        <p:spPr>
-          <a:xfrm>
-            <a:off x="5080525" y="760911"/>
-            <a:ext cx="3110199" cy="3621677"/>
-          </a:xfrm>
-          <a:prstGeom prst="rect">
-            <a:avLst/>
-          </a:prstGeom>
-        </p:spPr>
-      </p:pic>
-      <p:sp>
-        <p:nvSpPr>
-          <p:cNvPr id="6" name="Rectangle 5">
-            <a:extLst>
-              <a:ext uri="{FF2B5EF4-FFF2-40B4-BE49-F238E27FC236}">
-                <a16:creationId xmlns:a16="http://schemas.microsoft.com/office/drawing/2014/main" id="{362CF033-407A-4AE2-9CBC-ADB69706F635}"/>
-              </a:ext>
-            </a:extLst>
-          </p:cNvPr>
-          <p:cNvSpPr/>
-          <p:nvPr/>
-        </p:nvSpPr>
-        <p:spPr>
-          <a:xfrm>
-            <a:off x="5080525" y="760911"/>
-            <a:ext cx="3110199" cy="3621677"/>
-          </a:xfrm>
-          <a:prstGeom prst="rect">
-            <a:avLst/>
-          </a:prstGeom>
-          <a:noFill/>
-          <a:ln>
-            <a:solidFill>
-              <a:schemeClr val="tx1"/>
-            </a:solidFill>
-          </a:ln>
-        </p:spPr>
-        <p:style>
-          <a:lnRef idx="2">
-            <a:schemeClr val="accent1">
-              <a:shade val="50000"/>
-            </a:schemeClr>
-          </a:lnRef>
-          <a:fillRef idx="1">
-            <a:schemeClr val="accent1"/>
-          </a:fillRef>
-          <a:effectRef idx="0">
-            <a:schemeClr val="accent1"/>
-          </a:effectRef>
-          <a:fontRef idx="minor">
-            <a:schemeClr val="lt1"/>
-          </a:fontRef>
-        </p:style>
-        <p:txBody>
-          <a:bodyPr rtlCol="0" anchor="ctr"/>
-          <a:lstStyle/>
-          <a:p>
-            <a:pPr algn="ctr"/>
-            <a:endParaRPr lang="en-US"/>
-          </a:p>
-        </p:txBody>
-      </p:sp>
-      <p:pic>
-        <p:nvPicPr>
           <p:cNvPr id="1026" name="Picture 2" descr="Tinkercad – Приложения в Google Play">
             <a:extLst>
               <a:ext uri="{FF2B5EF4-FFF2-40B4-BE49-F238E27FC236}">
@@ -24495,7 +24401,7 @@
           <p:nvPr/>
         </p:nvPicPr>
         <p:blipFill>
-          <a:blip r:embed="rId3">
+          <a:blip r:embed="rId2">
             <a:extLst>
               <a:ext uri="{28A0092B-C50C-407E-A947-70E740481C1C}">
                 <a14:useLocalDpi xmlns:a14="http://schemas.microsoft.com/office/drawing/2010/main" val="0"/>
@@ -24543,6 +24449,82 @@
           <a:xfrm>
             <a:off x="2945673" y="731520"/>
             <a:ext cx="1136470" cy="1110343"/>
+          </a:xfrm>
+          <a:prstGeom prst="rect">
+            <a:avLst/>
+          </a:prstGeom>
+          <a:noFill/>
+          <a:ln>
+            <a:solidFill>
+              <a:schemeClr val="tx1"/>
+            </a:solidFill>
+          </a:ln>
+        </p:spPr>
+        <p:style>
+          <a:lnRef idx="2">
+            <a:schemeClr val="accent1">
+              <a:shade val="50000"/>
+            </a:schemeClr>
+          </a:lnRef>
+          <a:fillRef idx="1">
+            <a:schemeClr val="accent1"/>
+          </a:fillRef>
+          <a:effectRef idx="0">
+            <a:schemeClr val="accent1"/>
+          </a:effectRef>
+          <a:fontRef idx="minor">
+            <a:schemeClr val="lt1"/>
+          </a:fontRef>
+        </p:style>
+        <p:txBody>
+          <a:bodyPr rtlCol="0" anchor="ctr"/>
+          <a:lstStyle/>
+          <a:p>
+            <a:pPr algn="ctr"/>
+            <a:endParaRPr lang="en-US"/>
+          </a:p>
+        </p:txBody>
+      </p:sp>
+      <p:pic>
+        <p:nvPicPr>
+          <p:cNvPr id="3" name="Picture 2"/>
+          <p:cNvPicPr>
+            <a:picLocks noChangeAspect="1"/>
+          </p:cNvPicPr>
+          <p:nvPr/>
+        </p:nvPicPr>
+        <p:blipFill>
+          <a:blip r:embed="rId3"/>
+          <a:stretch>
+            <a:fillRect/>
+          </a:stretch>
+        </p:blipFill>
+        <p:spPr>
+          <a:xfrm>
+            <a:off x="5091083" y="777967"/>
+            <a:ext cx="3081737" cy="3558612"/>
+          </a:xfrm>
+          <a:prstGeom prst="rect">
+            <a:avLst/>
+          </a:prstGeom>
+        </p:spPr>
+      </p:pic>
+      <p:sp>
+        <p:nvSpPr>
+          <p:cNvPr id="6" name="Rectangle 5">
+            <a:extLst>
+              <a:ext uri="{FF2B5EF4-FFF2-40B4-BE49-F238E27FC236}">
+                <a16:creationId xmlns:a16="http://schemas.microsoft.com/office/drawing/2014/main" id="{362CF033-407A-4AE2-9CBC-ADB69706F635}"/>
+              </a:ext>
+            </a:extLst>
+          </p:cNvPr>
+          <p:cNvSpPr/>
+          <p:nvPr/>
+        </p:nvSpPr>
+        <p:spPr>
+          <a:xfrm>
+            <a:off x="5091083" y="777966"/>
+            <a:ext cx="3081737" cy="3558613"/>
           </a:xfrm>
           <a:prstGeom prst="rect">
             <a:avLst/>

</xml_diff>